<commit_message>
taura 2021-09-15 slide decks
</commit_message>
<xml_diff>
--- a/events/2021-09-15/slides/00-index.pptx
+++ b/events/2021-09-15/slides/00-index.pptx
@@ -227,7 +227,7 @@
             <a:fld id="{35305EB0-020F-4995-961E-A35B2BB78D2B}" type="datetimeFigureOut">
               <a:rPr kumimoji="1" lang="ja-JP" altLang="en-US" smtClean="0"/>
               <a:pPr/>
-              <a:t>2021/8/31</a:t>
+              <a:t>2021/9/11</a:t>
             </a:fld>
             <a:endParaRPr kumimoji="1" lang="ja-JP" altLang="en-US"/>
           </a:p>
@@ -53481,7 +53481,7 @@
             </a:r>
             <a:r>
               <a:rPr lang="ja-JP" altLang="en-US" dirty="0"/>
-              <a:t> 授業に必要な</a:t>
+              <a:t> 授業に使う</a:t>
             </a:r>
             <a:r>
               <a:rPr lang="en-US" altLang="ja-JP" dirty="0"/>
@@ -53489,7 +53489,7 @@
             </a:r>
             <a:r>
               <a:rPr lang="ja-JP" altLang="en-US" dirty="0"/>
-              <a:t>システムの概要</a:t>
+              <a:t>概要</a:t>
             </a:r>
             <a:r>
               <a:rPr lang="ja-JP" altLang="en-US" sz="2000" dirty="0"/>
@@ -53509,7 +53509,7 @@
             </a:r>
             <a:r>
               <a:rPr lang="en-US" altLang="ja-JP" sz="2000" dirty="0"/>
-              <a:t>25</a:t>
+              <a:t>20</a:t>
             </a:r>
             <a:r>
               <a:rPr kumimoji="1" lang="ja-JP" altLang="en-US" sz="2000" dirty="0"/>
@@ -53528,11 +53528,11 @@
           <a:p>
             <a:r>
               <a:rPr kumimoji="1" lang="en-US" altLang="ja-JP" dirty="0"/>
-              <a:t>2. 2020</a:t>
+              <a:t>2. </a:t>
             </a:r>
             <a:r>
               <a:rPr kumimoji="1" lang="ja-JP" altLang="en-US" dirty="0"/>
-              <a:t>年度振り返り</a:t>
+              <a:t>セキュリティ強化・多要素認証</a:t>
             </a:r>
             <a:r>
               <a:rPr kumimoji="1" lang="ja-JP" altLang="en-US" sz="2000" dirty="0"/>
@@ -53563,7 +53563,49 @@
           <a:p>
             <a:r>
               <a:rPr kumimoji="1" lang="en-US" altLang="ja-JP" dirty="0"/>
-              <a:t>3. ITC-LMS</a:t>
+              <a:t>3. VPN, </a:t>
+            </a:r>
+            <a:r>
+              <a:rPr kumimoji="1" lang="en-US" altLang="ja-JP" dirty="0" err="1"/>
+              <a:t>WiFi</a:t>
+            </a:r>
+            <a:r>
+              <a:rPr kumimoji="1" lang="ja-JP" altLang="en-US" sz="2000" dirty="0"/>
+              <a:t> </a:t>
+            </a:r>
+            <a:r>
+              <a:rPr kumimoji="1" lang="en-US" altLang="ja-JP" sz="2000" dirty="0"/>
+              <a:t>(</a:t>
+            </a:r>
+            <a:r>
+              <a:rPr kumimoji="1" lang="ja-JP" altLang="en-US" sz="2000" dirty="0"/>
+              <a:t>玉造</a:t>
+            </a:r>
+            <a:r>
+              <a:rPr kumimoji="1" lang="en-US" altLang="ja-JP" sz="2000" dirty="0"/>
+              <a:t>; </a:t>
+            </a:r>
+            <a:r>
+              <a:rPr lang="en-US" altLang="ja-JP" sz="2000" dirty="0"/>
+              <a:t>1</a:t>
+            </a:r>
+            <a:r>
+              <a:rPr kumimoji="1" lang="en-US" altLang="ja-JP" sz="2000" dirty="0"/>
+              <a:t>0</a:t>
+            </a:r>
+            <a:r>
+              <a:rPr kumimoji="1" lang="ja-JP" altLang="en-US" sz="2000" dirty="0"/>
+              <a:t>分</a:t>
+            </a:r>
+            <a:r>
+              <a:rPr kumimoji="1" lang="en-US" altLang="ja-JP" sz="2000" dirty="0"/>
+              <a:t>)</a:t>
+            </a:r>
+          </a:p>
+          <a:p>
+            <a:r>
+              <a:rPr kumimoji="1" lang="en-US" altLang="ja-JP" dirty="0"/>
+              <a:t>4. ITC-LMS</a:t>
             </a:r>
             <a:r>
               <a:rPr kumimoji="1" lang="ja-JP" altLang="en-US" dirty="0"/>
@@ -53622,7 +53664,7 @@
             </a:r>
             <a:r>
               <a:rPr kumimoji="1" lang="en-US" altLang="ja-JP" sz="2000" dirty="0"/>
-              <a:t>; 25</a:t>
+              <a:t>; 30</a:t>
             </a:r>
             <a:r>
               <a:rPr kumimoji="1" lang="ja-JP" altLang="en-US" sz="2000" dirty="0"/>

</xml_diff>